<commit_message>
Added slides on art programs.
</commit_message>
<xml_diff>
--- a/CSPB 3308 - Presentation PPT.pptx
+++ b/CSPB 3308 - Presentation PPT.pptx
@@ -15,14 +15,15 @@
     <p:sldId id="266" r:id="rId9"/>
     <p:sldId id="270" r:id="rId10"/>
     <p:sldId id="271" r:id="rId11"/>
-    <p:sldId id="263" r:id="rId12"/>
-    <p:sldId id="259" r:id="rId13"/>
-    <p:sldId id="260" r:id="rId14"/>
-    <p:sldId id="261" r:id="rId15"/>
-    <p:sldId id="264" r:id="rId16"/>
-    <p:sldId id="272" r:id="rId17"/>
-    <p:sldId id="274" r:id="rId18"/>
-    <p:sldId id="275" r:id="rId19"/>
+    <p:sldId id="276" r:id="rId12"/>
+    <p:sldId id="263" r:id="rId13"/>
+    <p:sldId id="259" r:id="rId14"/>
+    <p:sldId id="260" r:id="rId15"/>
+    <p:sldId id="261" r:id="rId16"/>
+    <p:sldId id="264" r:id="rId17"/>
+    <p:sldId id="272" r:id="rId18"/>
+    <p:sldId id="274" r:id="rId19"/>
+    <p:sldId id="275" r:id="rId20"/>
   </p:sldIdLst>
   <p:sldSz cx="12192000" cy="6858000"/>
   <p:notesSz cx="6858000" cy="9144000"/>
@@ -6001,10 +6002,10 @@
       </p:grpSpPr>
       <p:sp>
         <p:nvSpPr>
-          <p:cNvPr id="2" name="Title 1">
+          <p:cNvPr id="4" name="Title 3">
             <a:extLst>
               <a:ext uri="{FF2B5EF4-FFF2-40B4-BE49-F238E27FC236}">
-                <a16:creationId xmlns:a16="http://schemas.microsoft.com/office/drawing/2014/main" id="{E3FCFD75-C783-0310-6969-2EC7B7C25213}"/>
+                <a16:creationId xmlns:a16="http://schemas.microsoft.com/office/drawing/2014/main" id="{556178D5-C1FE-410A-960E-0B1D2E8435F9}"/>
               </a:ext>
             </a:extLst>
           </p:cNvPr>
@@ -6020,16 +6021,19 @@
           <a:bodyPr/>
           <a:lstStyle/>
           <a:p>
-            <a:endParaRPr lang="en-US"/>
-          </a:p>
-        </p:txBody>
-      </p:sp>
-      <p:sp>
-        <p:nvSpPr>
-          <p:cNvPr id="3" name="Text Placeholder 2">
+            <a:r>
+              <a:rPr lang="en-US" dirty="0"/>
+              <a:t>Card Creator</a:t>
+            </a:r>
+          </a:p>
+        </p:txBody>
+      </p:sp>
+      <p:sp>
+        <p:nvSpPr>
+          <p:cNvPr id="5" name="Content Placeholder 4">
             <a:extLst>
               <a:ext uri="{FF2B5EF4-FFF2-40B4-BE49-F238E27FC236}">
-                <a16:creationId xmlns:a16="http://schemas.microsoft.com/office/drawing/2014/main" id="{9CF41E4A-A909-DBB8-C016-0110AFF5F173}"/>
+                <a16:creationId xmlns:a16="http://schemas.microsoft.com/office/drawing/2014/main" id="{5DBCAC33-5626-43CC-B5CF-BCE10396C23E}"/>
               </a:ext>
             </a:extLst>
           </p:cNvPr>
@@ -6037,7 +6041,7 @@
             <a:spLocks noGrp="1"/>
           </p:cNvSpPr>
           <p:nvPr>
-            <p:ph type="body" idx="1"/>
+            <p:ph sz="half" idx="1"/>
           </p:nvPr>
         </p:nvSpPr>
         <p:spPr/>
@@ -6045,10 +6049,60 @@
           <a:bodyPr/>
           <a:lstStyle/>
           <a:p>
-            <a:endParaRPr lang="en-US"/>
-          </a:p>
-        </p:txBody>
-      </p:sp>
+            <a:r>
+              <a:rPr lang="en-US" dirty="0"/>
+              <a:t>For creating the images of the cards used in the game, a program called Card Creator was used.</a:t>
+            </a:r>
+          </a:p>
+          <a:p>
+            <a:r>
+              <a:rPr lang="en-US" dirty="0"/>
+              <a:t>Card Creator is designed for use in creating card games or tabletop games, and can create cards and tokens in a variety of standard shapes.</a:t>
+            </a:r>
+          </a:p>
+          <a:p>
+            <a:r>
+              <a:rPr lang="en-US" dirty="0"/>
+              <a:t>We chose to use a nonstandard set of card suits to fit the icons available through Card Creator.</a:t>
+            </a:r>
+          </a:p>
+        </p:txBody>
+      </p:sp>
+      <p:pic>
+        <p:nvPicPr>
+          <p:cNvPr id="8" name="Content Placeholder 7">
+            <a:extLst>
+              <a:ext uri="{FF2B5EF4-FFF2-40B4-BE49-F238E27FC236}">
+                <a16:creationId xmlns:a16="http://schemas.microsoft.com/office/drawing/2014/main" id="{7BD01F98-D225-474F-8E38-F30781CD129A}"/>
+              </a:ext>
+            </a:extLst>
+          </p:cNvPr>
+          <p:cNvPicPr>
+            <a:picLocks noGrp="1" noChangeAspect="1"/>
+          </p:cNvPicPr>
+          <p:nvPr>
+            <p:ph sz="half" idx="2"/>
+          </p:nvPr>
+        </p:nvPicPr>
+        <p:blipFill>
+          <a:blip r:embed="rId2">
+            <a:extLst>
+              <a:ext uri="{28A0092B-C50C-407E-A947-70E740481C1C}">
+                <a14:useLocalDpi xmlns:a14="http://schemas.microsoft.com/office/drawing/2010/main" val="0"/>
+              </a:ext>
+            </a:extLst>
+          </a:blip>
+          <a:stretch>
+            <a:fillRect/>
+          </a:stretch>
+        </p:blipFill>
+        <p:spPr>
+          <a:xfrm>
+            <a:off x="6447458" y="2862513"/>
+            <a:ext cx="4783483" cy="2687136"/>
+          </a:xfrm>
+        </p:spPr>
+      </p:pic>
     </p:spTree>
     <p:extLst>
       <p:ext uri="{BB962C8B-B14F-4D97-AF65-F5344CB8AC3E}">
@@ -6081,10 +6135,10 @@
       </p:grpSpPr>
       <p:sp>
         <p:nvSpPr>
-          <p:cNvPr id="4" name="Title 3">
+          <p:cNvPr id="2" name="Title 1">
             <a:extLst>
               <a:ext uri="{FF2B5EF4-FFF2-40B4-BE49-F238E27FC236}">
-                <a16:creationId xmlns:a16="http://schemas.microsoft.com/office/drawing/2014/main" id="{68A1FF93-691B-027E-7F85-9E81239EE4A1}"/>
+                <a16:creationId xmlns:a16="http://schemas.microsoft.com/office/drawing/2014/main" id="{CE872274-41C2-4952-80E1-181E1E43F753}"/>
               </a:ext>
             </a:extLst>
           </p:cNvPr>
@@ -6095,19 +6149,89 @@
             <p:ph type="title"/>
           </p:nvPr>
         </p:nvSpPr>
-        <p:spPr>
-          <a:xfrm>
-            <a:off x="685800" y="753534"/>
-            <a:ext cx="10820399" cy="2885406"/>
-          </a:xfrm>
-        </p:spPr>
+        <p:spPr/>
         <p:txBody>
           <a:bodyPr/>
           <a:lstStyle/>
           <a:p>
             <a:r>
               <a:rPr lang="en-US" dirty="0"/>
-              <a:t>Additional Tools Used</a:t>
+              <a:t>Clip Studio Paint</a:t>
+            </a:r>
+          </a:p>
+        </p:txBody>
+      </p:sp>
+      <p:pic>
+        <p:nvPicPr>
+          <p:cNvPr id="6" name="Content Placeholder 5">
+            <a:extLst>
+              <a:ext uri="{FF2B5EF4-FFF2-40B4-BE49-F238E27FC236}">
+                <a16:creationId xmlns:a16="http://schemas.microsoft.com/office/drawing/2014/main" id="{95D20015-7669-44C7-9BCC-4E5A34AE063D}"/>
+              </a:ext>
+            </a:extLst>
+          </p:cNvPr>
+          <p:cNvPicPr>
+            <a:picLocks noGrp="1" noChangeAspect="1"/>
+          </p:cNvPicPr>
+          <p:nvPr>
+            <p:ph sz="half" idx="1"/>
+          </p:nvPr>
+        </p:nvPicPr>
+        <p:blipFill>
+          <a:blip r:embed="rId2">
+            <a:extLst>
+              <a:ext uri="{28A0092B-C50C-407E-A947-70E740481C1C}">
+                <a14:useLocalDpi xmlns:a14="http://schemas.microsoft.com/office/drawing/2010/main" val="0"/>
+              </a:ext>
+            </a:extLst>
+          </a:blip>
+          <a:stretch>
+            <a:fillRect/>
+          </a:stretch>
+        </p:blipFill>
+        <p:spPr>
+          <a:xfrm>
+            <a:off x="685800" y="2648595"/>
+            <a:ext cx="5334000" cy="3114972"/>
+          </a:xfrm>
+        </p:spPr>
+      </p:pic>
+      <p:sp>
+        <p:nvSpPr>
+          <p:cNvPr id="4" name="Content Placeholder 3">
+            <a:extLst>
+              <a:ext uri="{FF2B5EF4-FFF2-40B4-BE49-F238E27FC236}">
+                <a16:creationId xmlns:a16="http://schemas.microsoft.com/office/drawing/2014/main" id="{DFF56760-CFA7-4B84-BB37-979987059039}"/>
+              </a:ext>
+            </a:extLst>
+          </p:cNvPr>
+          <p:cNvSpPr>
+            <a:spLocks noGrp="1"/>
+          </p:cNvSpPr>
+          <p:nvPr>
+            <p:ph sz="half" idx="2"/>
+          </p:nvPr>
+        </p:nvSpPr>
+        <p:spPr/>
+        <p:txBody>
+          <a:bodyPr/>
+          <a:lstStyle/>
+          <a:p>
+            <a:r>
+              <a:rPr lang="en-US" dirty="0"/>
+              <a:t>Clip Studio Paint is an extremely versatile art program that can be used for a wide variety of purposes.</a:t>
+            </a:r>
+          </a:p>
+          <a:p>
+            <a:r>
+              <a:rPr lang="en-US" dirty="0"/>
+              <a:t>We used it to create the images for the decks themselves, in several sizes.</a:t>
+            </a:r>
+          </a:p>
+          <a:p>
+            <a:r>
+              <a:rPr lang="en-US" dirty="0"/>
+              <a:t>This allowed us to have the decks change size through a game as cards are divided between them.</a:t>
             </a:r>
           </a:p>
         </p:txBody>
@@ -6115,7 +6239,7 @@
     </p:spTree>
     <p:extLst>
       <p:ext uri="{BB962C8B-B14F-4D97-AF65-F5344CB8AC3E}">
-        <p14:creationId xmlns:p14="http://schemas.microsoft.com/office/powerpoint/2010/main" val="417111413"/>
+        <p14:creationId xmlns:p14="http://schemas.microsoft.com/office/powerpoint/2010/main" val="3951758414"/>
       </p:ext>
     </p:extLst>
   </p:cSld>
@@ -6128,14 +6252,6 @@
 <file path=ppt/slides/slide12.xml><?xml version="1.0" encoding="utf-8"?>
 <p:sld xmlns:a="http://schemas.openxmlformats.org/drawingml/2006/main" xmlns:r="http://schemas.openxmlformats.org/officeDocument/2006/relationships" xmlns:p="http://schemas.openxmlformats.org/presentationml/2006/main">
   <p:cSld>
-    <p:bg>
-      <p:bgPr>
-        <a:solidFill>
-          <a:schemeClr val="bg1"/>
-        </a:solidFill>
-        <a:effectLst/>
-      </p:bgPr>
-    </p:bg>
     <p:spTree>
       <p:nvGrpSpPr>
         <p:cNvPr id="1" name=""/>
@@ -6150,360 +6266,43 @@
           <a:chExt cx="0" cy="0"/>
         </a:xfrm>
       </p:grpSpPr>
-      <p:sp useBgFill="1">
-        <p:nvSpPr>
-          <p:cNvPr id="10" name="Rectangle 9">
+      <p:sp>
+        <p:nvSpPr>
+          <p:cNvPr id="4" name="Title 3">
             <a:extLst>
               <a:ext uri="{FF2B5EF4-FFF2-40B4-BE49-F238E27FC236}">
-                <a16:creationId xmlns:a16="http://schemas.microsoft.com/office/drawing/2014/main" id="{BD7C2DEF-63C5-495B-BBE5-720E5D12B4D2}"/>
-              </a:ext>
-              <a:ext uri="{C183D7F6-B498-43B3-948B-1728B52AA6E4}">
-                <adec:decorative xmlns:adec="http://schemas.microsoft.com/office/drawing/2017/decorative" val="1"/>
+                <a16:creationId xmlns:a16="http://schemas.microsoft.com/office/drawing/2014/main" id="{68A1FF93-691B-027E-7F85-9E81239EE4A1}"/>
               </a:ext>
             </a:extLst>
           </p:cNvPr>
           <p:cNvSpPr>
-            <a:spLocks noGrp="1" noRot="1" noChangeAspect="1" noMove="1" noResize="1" noEditPoints="1" noAdjustHandles="1" noChangeArrowheads="1" noChangeShapeType="1" noTextEdit="1"/>
-          </p:cNvSpPr>
-          <p:nvPr>
-            <p:extLst>
-              <p:ext uri="{386F3935-93C4-4BCD-93E2-E3B085C9AB24}">
-                <p16:designElem xmlns:p16="http://schemas.microsoft.com/office/powerpoint/2015/main" val="1"/>
-              </p:ext>
-            </p:extLst>
-          </p:nvPr>
-        </p:nvSpPr>
-        <p:spPr>
-          <a:xfrm>
-            <a:off x="0" y="0"/>
-            <a:ext cx="12192000" cy="6858000"/>
-          </a:xfrm>
-          <a:prstGeom prst="rect">
-            <a:avLst/>
-          </a:prstGeom>
-          <a:ln>
-            <a:noFill/>
-          </a:ln>
-        </p:spPr>
-        <p:style>
-          <a:lnRef idx="2">
-            <a:schemeClr val="accent1">
-              <a:shade val="50000"/>
-            </a:schemeClr>
-          </a:lnRef>
-          <a:fillRef idx="1">
-            <a:schemeClr val="accent1"/>
-          </a:fillRef>
-          <a:effectRef idx="0">
-            <a:schemeClr val="accent1"/>
-          </a:effectRef>
-          <a:fontRef idx="minor">
-            <a:schemeClr val="lt1"/>
-          </a:fontRef>
-        </p:style>
-        <p:txBody>
-          <a:bodyPr rtlCol="0" anchor="ctr"/>
-          <a:lstStyle/>
-          <a:p>
-            <a:pPr algn="ctr"/>
-            <a:endParaRPr lang="en-US"/>
-          </a:p>
-        </p:txBody>
-      </p:sp>
-      <p:pic>
-        <p:nvPicPr>
-          <p:cNvPr id="12" name="Picture 11">
-            <a:extLst>
-              <a:ext uri="{FF2B5EF4-FFF2-40B4-BE49-F238E27FC236}">
-                <a16:creationId xmlns:a16="http://schemas.microsoft.com/office/drawing/2014/main" id="{FE21E403-0B61-4473-BE57-AB0F16379674}"/>
-              </a:ext>
-              <a:ext uri="{C183D7F6-B498-43B3-948B-1728B52AA6E4}">
-                <adec:decorative xmlns:adec="http://schemas.microsoft.com/office/drawing/2017/decorative" val="1"/>
-              </a:ext>
-            </a:extLst>
-          </p:cNvPr>
-          <p:cNvPicPr>
-            <a:picLocks noGrp="1" noRot="1" noChangeAspect="1" noMove="1" noResize="1" noEditPoints="1" noAdjustHandles="1" noChangeArrowheads="1" noChangeShapeType="1" noCrop="1"/>
-          </p:cNvPicPr>
-          <p:nvPr>
-            <p:extLst>
-              <p:ext uri="{386F3935-93C4-4BCD-93E2-E3B085C9AB24}">
-                <p16:designElem xmlns:p16="http://schemas.microsoft.com/office/powerpoint/2015/main" val="1"/>
-              </p:ext>
-            </p:extLst>
-          </p:nvPr>
-        </p:nvPicPr>
-        <p:blipFill>
-          <a:blip r:embed="rId2">
-            <a:extLst>
-              <a:ext uri="{28A0092B-C50C-407E-A947-70E740481C1C}">
-                <a14:useLocalDpi xmlns:a14="http://schemas.microsoft.com/office/drawing/2010/main" val="0"/>
-              </a:ext>
-            </a:extLst>
-          </a:blip>
-          <a:stretch>
-            <a:fillRect/>
-          </a:stretch>
-        </p:blipFill>
-        <p:spPr>
-          <a:xfrm>
-            <a:off x="0" y="0"/>
-            <a:ext cx="12192000" cy="1441450"/>
-          </a:xfrm>
-          <a:prstGeom prst="rect">
-            <a:avLst/>
-          </a:prstGeom>
-        </p:spPr>
-      </p:pic>
-      <p:sp>
-        <p:nvSpPr>
-          <p:cNvPr id="2" name="Title 1">
-            <a:extLst>
-              <a:ext uri="{FF2B5EF4-FFF2-40B4-BE49-F238E27FC236}">
-                <a16:creationId xmlns:a16="http://schemas.microsoft.com/office/drawing/2014/main" id="{81488890-FF45-40AA-8B13-E0941EC28271}"/>
-              </a:ext>
-            </a:extLst>
-          </p:cNvPr>
-          <p:cNvSpPr>
-            <a:spLocks noGrp="1"/>
-          </p:cNvSpPr>
-          <p:nvPr>
-            <p:ph type="ctrTitle"/>
-          </p:nvPr>
-        </p:nvSpPr>
-        <p:spPr>
-          <a:xfrm>
-            <a:off x="1707208" y="146892"/>
-            <a:ext cx="8777583" cy="1147665"/>
-          </a:xfrm>
-          <a:noFill/>
-          <a:ln w="19050">
-            <a:noFill/>
-            <a:prstDash val="dash"/>
-          </a:ln>
-        </p:spPr>
-        <p:txBody>
-          <a:bodyPr vert="horz" lIns="91440" tIns="45720" rIns="91440" bIns="45720" rtlCol="0" anchor="ctr">
-            <a:normAutofit/>
-          </a:bodyPr>
-          <a:lstStyle/>
-          <a:p>
-            <a:pPr algn="ctr"/>
-            <a:r>
-              <a:rPr lang="en-US" sz="4800" dirty="0"/>
-              <a:t>Version Control</a:t>
-            </a:r>
-            <a:endParaRPr lang="en-US" sz="4800" kern="1200" dirty="0">
-              <a:latin typeface="+mj-lt"/>
-              <a:ea typeface="+mj-ea"/>
-              <a:cs typeface="+mj-cs"/>
-            </a:endParaRPr>
-          </a:p>
-        </p:txBody>
-      </p:sp>
-      <p:sp>
-        <p:nvSpPr>
-          <p:cNvPr id="3" name="Subtitle 2">
-            <a:extLst>
-              <a:ext uri="{FF2B5EF4-FFF2-40B4-BE49-F238E27FC236}">
-                <a16:creationId xmlns:a16="http://schemas.microsoft.com/office/drawing/2014/main" id="{59BD3E99-0796-496A-BCDB-1B3AD99472B3}"/>
-              </a:ext>
-            </a:extLst>
-          </p:cNvPr>
-          <p:cNvSpPr>
-            <a:spLocks noGrp="1"/>
-          </p:cNvSpPr>
-          <p:nvPr>
-            <p:ph type="subTitle" idx="1"/>
-          </p:nvPr>
-        </p:nvSpPr>
-        <p:spPr>
-          <a:xfrm>
-            <a:off x="4921496" y="1588342"/>
-            <a:ext cx="6887402" cy="1240398"/>
-          </a:xfrm>
-          <a:noFill/>
-          <a:ln w="19050">
-            <a:noFill/>
-            <a:prstDash val="dash"/>
-          </a:ln>
-        </p:spPr>
-        <p:txBody>
-          <a:bodyPr vert="horz" lIns="91440" tIns="45720" rIns="91440" bIns="45720" rtlCol="0" anchor="ctr">
-            <a:noAutofit/>
-          </a:bodyPr>
-          <a:lstStyle/>
-          <a:p>
-            <a:pPr indent="-228600" algn="r">
-              <a:buFont typeface="Arial" panose="020B0604020202020204" pitchFamily="34" charset="0"/>
-              <a:buChar char="•"/>
-            </a:pPr>
-            <a:endParaRPr lang="en-US" sz="1800" dirty="0"/>
-          </a:p>
-          <a:p>
-            <a:pPr algn="ctr"/>
-            <a:r>
-              <a:rPr lang="en-US" sz="1800" dirty="0"/>
-              <a:t>We used GitHub’s browser platform as well as GitHub Desktop for version control</a:t>
-            </a:r>
-          </a:p>
-          <a:p>
-            <a:pPr algn="ctr"/>
-            <a:endParaRPr lang="en-US" sz="1800" dirty="0"/>
-          </a:p>
-        </p:txBody>
-      </p:sp>
-      <p:pic>
-        <p:nvPicPr>
-          <p:cNvPr id="7" name="Graphic 6" descr="Network diagram with solid fill">
-            <a:extLst>
-              <a:ext uri="{FF2B5EF4-FFF2-40B4-BE49-F238E27FC236}">
-                <a16:creationId xmlns:a16="http://schemas.microsoft.com/office/drawing/2014/main" id="{EEC7949E-BFB5-182A-396B-B7FCE416F153}"/>
-              </a:ext>
-            </a:extLst>
-          </p:cNvPr>
-          <p:cNvPicPr>
-            <a:picLocks noChangeAspect="1"/>
-          </p:cNvPicPr>
-          <p:nvPr/>
-        </p:nvPicPr>
-        <p:blipFill>
-          <a:blip r:embed="rId3">
-            <a:extLst>
-              <a:ext uri="{28A0092B-C50C-407E-A947-70E740481C1C}">
-                <a14:useLocalDpi xmlns:a14="http://schemas.microsoft.com/office/drawing/2010/main" val="0"/>
-              </a:ext>
-              <a:ext uri="{96DAC541-7B7A-43D3-8B79-37D633B846F1}">
-                <asvg:svgBlip xmlns:asvg="http://schemas.microsoft.com/office/drawing/2016/SVG/main" r:embed="rId4"/>
-              </a:ext>
-            </a:extLst>
-          </a:blip>
-          <a:srcRect/>
-          <a:stretch/>
-        </p:blipFill>
-        <p:spPr>
-          <a:xfrm>
-            <a:off x="194421" y="1831336"/>
-            <a:ext cx="3758102" cy="3758102"/>
-          </a:xfrm>
-          <a:prstGeom prst="rect">
-            <a:avLst/>
-          </a:prstGeom>
-        </p:spPr>
-      </p:pic>
-      <p:sp>
-        <p:nvSpPr>
-          <p:cNvPr id="4" name="TextBox 3">
-            <a:extLst>
-              <a:ext uri="{FF2B5EF4-FFF2-40B4-BE49-F238E27FC236}">
-                <a16:creationId xmlns:a16="http://schemas.microsoft.com/office/drawing/2014/main" id="{95ABE48C-C297-AE8C-7450-AF3C2757C19C}"/>
-              </a:ext>
-            </a:extLst>
-          </p:cNvPr>
-          <p:cNvSpPr txBox="1"/>
-          <p:nvPr/>
-        </p:nvSpPr>
-        <p:spPr>
-          <a:xfrm>
-            <a:off x="4921496" y="2660473"/>
-            <a:ext cx="6887402" cy="1754326"/>
-          </a:xfrm>
-          <a:prstGeom prst="rect">
-            <a:avLst/>
-          </a:prstGeom>
-          <a:noFill/>
-          <a:ln>
-            <a:noFill/>
-          </a:ln>
-        </p:spPr>
-        <p:txBody>
-          <a:bodyPr wrap="square" rtlCol="0">
-            <a:spAutoFit/>
-          </a:bodyPr>
-          <a:lstStyle/>
-          <a:p>
-            <a:pPr algn="ctr"/>
-            <a:r>
-              <a:rPr lang="en-US" u="sng" dirty="0"/>
-              <a:t>Reasons we chose GitHub</a:t>
-            </a:r>
-          </a:p>
-          <a:p>
-            <a:pPr algn="ctr"/>
+            <a:spLocks noGrp="1"/>
+          </p:cNvSpPr>
+          <p:nvPr>
+            <p:ph type="title"/>
+          </p:nvPr>
+        </p:nvSpPr>
+        <p:spPr>
+          <a:xfrm>
+            <a:off x="685800" y="753534"/>
+            <a:ext cx="10820399" cy="2885406"/>
+          </a:xfrm>
+        </p:spPr>
+        <p:txBody>
+          <a:bodyPr/>
+          <a:lstStyle/>
+          <a:p>
             <a:r>
               <a:rPr lang="en-US" dirty="0"/>
-              <a:t>Ease of Use</a:t>
-            </a:r>
-          </a:p>
-          <a:p>
-            <a:pPr algn="ctr"/>
-            <a:r>
-              <a:rPr lang="en-US" dirty="0"/>
-              <a:t>Quick updates for rest of team</a:t>
-            </a:r>
-          </a:p>
-          <a:p>
-            <a:pPr algn="ctr"/>
-            <a:r>
-              <a:rPr lang="en-US" dirty="0"/>
-              <a:t>Ability to work on code independently</a:t>
-            </a:r>
-          </a:p>
-          <a:p>
-            <a:pPr algn="ctr"/>
-            <a:r>
-              <a:rPr lang="en-US" dirty="0"/>
-              <a:t>Branching capabilities to try different methods of fixing the same problem simultaneously</a:t>
-            </a:r>
-          </a:p>
-        </p:txBody>
-      </p:sp>
-      <p:sp>
-        <p:nvSpPr>
-          <p:cNvPr id="17" name="TextBox 16">
-            <a:extLst>
-              <a:ext uri="{FF2B5EF4-FFF2-40B4-BE49-F238E27FC236}">
-                <a16:creationId xmlns:a16="http://schemas.microsoft.com/office/drawing/2014/main" id="{E4A0172A-C24D-E2FF-3D87-9C1B2A7E38D6}"/>
-              </a:ext>
-            </a:extLst>
-          </p:cNvPr>
-          <p:cNvSpPr txBox="1"/>
-          <p:nvPr/>
-        </p:nvSpPr>
-        <p:spPr>
-          <a:xfrm>
-            <a:off x="4921496" y="4657374"/>
-            <a:ext cx="6887402" cy="323165"/>
-          </a:xfrm>
-          <a:prstGeom prst="rect">
-            <a:avLst/>
-          </a:prstGeom>
-          <a:noFill/>
-        </p:spPr>
-        <p:txBody>
-          <a:bodyPr wrap="square" rtlCol="0">
-            <a:spAutoFit/>
-          </a:bodyPr>
-          <a:lstStyle/>
-          <a:p>
-            <a:r>
-              <a:rPr lang="en-US" sz="1500" dirty="0"/>
-              <a:t>Project Repository:  </a:t>
-            </a:r>
-            <a:r>
-              <a:rPr lang="en-US" sz="1500" u="sng" dirty="0">
-                <a:hlinkClick r:id="rId5"/>
-              </a:rPr>
-              <a:t>https://github.com/rodu4835/CSPB_3308_Team_3</a:t>
-            </a:r>
-            <a:endParaRPr lang="en-US" sz="1500" dirty="0"/>
+              <a:t>Additional Tools Used</a:t>
+            </a:r>
           </a:p>
         </p:txBody>
       </p:sp>
     </p:spTree>
     <p:extLst>
       <p:ext uri="{BB962C8B-B14F-4D97-AF65-F5344CB8AC3E}">
-        <p14:creationId xmlns:p14="http://schemas.microsoft.com/office/powerpoint/2010/main" val="3292648982"/>
+        <p14:creationId xmlns:p14="http://schemas.microsoft.com/office/powerpoint/2010/main" val="417111413"/>
       </p:ext>
     </p:extLst>
   </p:cSld>
@@ -6538,21 +6337,21 @@
           <a:chExt cx="0" cy="0"/>
         </a:xfrm>
       </p:grpSpPr>
-      <p:pic>
-        <p:nvPicPr>
-          <p:cNvPr id="16" name="Picture 9">
+      <p:sp useBgFill="1">
+        <p:nvSpPr>
+          <p:cNvPr id="10" name="Rectangle 9">
             <a:extLst>
               <a:ext uri="{FF2B5EF4-FFF2-40B4-BE49-F238E27FC236}">
-                <a16:creationId xmlns:a16="http://schemas.microsoft.com/office/drawing/2014/main" id="{BDFADFB3-3D44-49A8-AE3B-A87C61607F7E}"/>
+                <a16:creationId xmlns:a16="http://schemas.microsoft.com/office/drawing/2014/main" id="{BD7C2DEF-63C5-495B-BBE5-720E5D12B4D2}"/>
               </a:ext>
               <a:ext uri="{C183D7F6-B498-43B3-948B-1728B52AA6E4}">
                 <adec:decorative xmlns:adec="http://schemas.microsoft.com/office/drawing/2017/decorative" val="1"/>
               </a:ext>
             </a:extLst>
           </p:cNvPr>
-          <p:cNvPicPr>
-            <a:picLocks noGrp="1" noRot="1" noChangeAspect="1" noMove="1" noResize="1" noEditPoints="1" noAdjustHandles="1" noChangeArrowheads="1" noChangeShapeType="1" noCrop="1"/>
-          </p:cNvPicPr>
+          <p:cNvSpPr>
+            <a:spLocks noGrp="1" noRot="1" noChangeAspect="1" noMove="1" noResize="1" noEditPoints="1" noAdjustHandles="1" noChangeArrowheads="1" noChangeShapeType="1" noTextEdit="1"/>
+          </p:cNvSpPr>
           <p:nvPr>
             <p:extLst>
               <p:ext uri="{386F3935-93C4-4BCD-93E2-E3B085C9AB24}">
@@ -6560,6 +6359,66 @@
               </p:ext>
             </p:extLst>
           </p:nvPr>
+        </p:nvSpPr>
+        <p:spPr>
+          <a:xfrm>
+            <a:off x="0" y="0"/>
+            <a:ext cx="12192000" cy="6858000"/>
+          </a:xfrm>
+          <a:prstGeom prst="rect">
+            <a:avLst/>
+          </a:prstGeom>
+          <a:ln>
+            <a:noFill/>
+          </a:ln>
+        </p:spPr>
+        <p:style>
+          <a:lnRef idx="2">
+            <a:schemeClr val="accent1">
+              <a:shade val="50000"/>
+            </a:schemeClr>
+          </a:lnRef>
+          <a:fillRef idx="1">
+            <a:schemeClr val="accent1"/>
+          </a:fillRef>
+          <a:effectRef idx="0">
+            <a:schemeClr val="accent1"/>
+          </a:effectRef>
+          <a:fontRef idx="minor">
+            <a:schemeClr val="lt1"/>
+          </a:fontRef>
+        </p:style>
+        <p:txBody>
+          <a:bodyPr rtlCol="0" anchor="ctr"/>
+          <a:lstStyle/>
+          <a:p>
+            <a:pPr algn="ctr"/>
+            <a:endParaRPr lang="en-US"/>
+          </a:p>
+        </p:txBody>
+      </p:sp>
+      <p:pic>
+        <p:nvPicPr>
+          <p:cNvPr id="12" name="Picture 11">
+            <a:extLst>
+              <a:ext uri="{FF2B5EF4-FFF2-40B4-BE49-F238E27FC236}">
+                <a16:creationId xmlns:a16="http://schemas.microsoft.com/office/drawing/2014/main" id="{FE21E403-0B61-4473-BE57-AB0F16379674}"/>
+              </a:ext>
+              <a:ext uri="{C183D7F6-B498-43B3-948B-1728B52AA6E4}">
+                <adec:decorative xmlns:adec="http://schemas.microsoft.com/office/drawing/2017/decorative" val="1"/>
+              </a:ext>
+            </a:extLst>
+          </p:cNvPr>
+          <p:cNvPicPr>
+            <a:picLocks noGrp="1" noRot="1" noChangeAspect="1" noMove="1" noResize="1" noEditPoints="1" noAdjustHandles="1" noChangeArrowheads="1" noChangeShapeType="1" noCrop="1"/>
+          </p:cNvPicPr>
+          <p:nvPr>
+            <p:extLst>
+              <p:ext uri="{386F3935-93C4-4BCD-93E2-E3B085C9AB24}">
+                <p16:designElem xmlns:p16="http://schemas.microsoft.com/office/powerpoint/2015/main" val="1"/>
+              </p:ext>
+            </p:extLst>
+          </p:nvPr>
         </p:nvPicPr>
         <p:blipFill>
           <a:blip r:embed="rId2">
@@ -6601,9 +6460,14 @@
         </p:nvSpPr>
         <p:spPr>
           <a:xfrm>
-            <a:off x="2895600" y="764373"/>
-            <a:ext cx="8610600" cy="1293028"/>
-          </a:xfrm>
+            <a:off x="1707208" y="146892"/>
+            <a:ext cx="8777583" cy="1147665"/>
+          </a:xfrm>
+          <a:noFill/>
+          <a:ln w="19050">
+            <a:noFill/>
+            <a:prstDash val="dash"/>
+          </a:ln>
         </p:spPr>
         <p:txBody>
           <a:bodyPr vert="horz" lIns="91440" tIns="45720" rIns="91440" bIns="45720" rtlCol="0" anchor="ctr">
@@ -6611,18 +6475,16 @@
           </a:bodyPr>
           <a:lstStyle/>
           <a:p>
-            <a:pPr algn="r"/>
-            <a:r>
-              <a:rPr lang="en-US" sz="4000" kern="1200" cap="all" baseline="0" dirty="0">
-                <a:solidFill>
-                  <a:schemeClr val="tx1"/>
-                </a:solidFill>
-                <a:latin typeface="+mj-lt"/>
-                <a:ea typeface="+mj-ea"/>
-                <a:cs typeface="+mj-cs"/>
-              </a:rPr>
-              <a:t>Agile Development and communication</a:t>
-            </a:r>
+            <a:pPr algn="ctr"/>
+            <a:r>
+              <a:rPr lang="en-US" sz="4800" dirty="0"/>
+              <a:t>Version Control</a:t>
+            </a:r>
+            <a:endParaRPr lang="en-US" sz="4800" kern="1200" dirty="0">
+              <a:latin typeface="+mj-lt"/>
+              <a:ea typeface="+mj-ea"/>
+              <a:cs typeface="+mj-cs"/>
+            </a:endParaRPr>
           </a:p>
         </p:txBody>
       </p:sp>
@@ -6644,107 +6506,46 @@
         </p:nvSpPr>
         <p:spPr>
           <a:xfrm>
-            <a:off x="677333" y="2194560"/>
-            <a:ext cx="5816600" cy="4024125"/>
-          </a:xfrm>
-        </p:spPr>
-        <p:txBody>
-          <a:bodyPr vert="horz" lIns="91440" tIns="45720" rIns="91440" bIns="45720" rtlCol="0">
-            <a:normAutofit/>
+            <a:off x="4921496" y="1588342"/>
+            <a:ext cx="6887402" cy="1240398"/>
+          </a:xfrm>
+          <a:noFill/>
+          <a:ln w="19050">
+            <a:noFill/>
+            <a:prstDash val="dash"/>
+          </a:ln>
+        </p:spPr>
+        <p:txBody>
+          <a:bodyPr vert="horz" lIns="91440" tIns="45720" rIns="91440" bIns="45720" rtlCol="0" anchor="ctr">
+            <a:noAutofit/>
           </a:bodyPr>
           <a:lstStyle/>
           <a:p>
-            <a:pPr indent="-228600">
+            <a:pPr indent="-228600" algn="r">
               <a:buFont typeface="Arial" panose="020B0604020202020204" pitchFamily="34" charset="0"/>
               <a:buChar char="•"/>
             </a:pPr>
-            <a:r>
-              <a:rPr lang="en-US" sz="1600" dirty="0"/>
-              <a:t>We began the semester using standard Scrum method, with standup meetings and Jordan Sims acting as Scrum Master</a:t>
-            </a:r>
-          </a:p>
-          <a:p>
-            <a:pPr indent="-228600">
-              <a:buFont typeface="Arial" panose="020B0604020202020204" pitchFamily="34" charset="0"/>
-              <a:buChar char="•"/>
-            </a:pPr>
-            <a:r>
-              <a:rPr lang="en-US" sz="1600" dirty="0"/>
-              <a:t>With four team members in four time zones, we realized early on that we were more productive having continual discussion via text messaging in Discord  </a:t>
-            </a:r>
-          </a:p>
-          <a:p>
-            <a:pPr indent="-228600">
-              <a:buFont typeface="Arial" panose="020B0604020202020204" pitchFamily="34" charset="0"/>
-              <a:buChar char="•"/>
-            </a:pPr>
-            <a:r>
-              <a:rPr lang="en-US" sz="1600" dirty="0"/>
-              <a:t>We created a channel for Team 3 and discussed the project regularly in that format  </a:t>
-            </a:r>
-          </a:p>
-          <a:p>
-            <a:pPr indent="-228600">
-              <a:buFont typeface="Arial" panose="020B0604020202020204" pitchFamily="34" charset="0"/>
-              <a:buChar char="•"/>
-            </a:pPr>
-            <a:r>
-              <a:rPr lang="en-US" sz="1600" dirty="0"/>
-              <a:t>We also accumulated checklist items that the members would volunteer to take on and report progress via the Discord channel  </a:t>
-            </a:r>
-          </a:p>
-          <a:p>
-            <a:pPr indent="-228600">
-              <a:buFont typeface="Arial" panose="020B0604020202020204" pitchFamily="34" charset="0"/>
-              <a:buChar char="•"/>
-            </a:pPr>
-            <a:r>
-              <a:rPr lang="en-US" sz="1600" dirty="0"/>
-              <a:t>We held “in-person“ video meetings as needed to promote progress and assess project goals</a:t>
-            </a:r>
-          </a:p>
-          <a:p>
-            <a:pPr indent="-228600">
-              <a:buFont typeface="Arial" panose="020B0604020202020204" pitchFamily="34" charset="0"/>
-              <a:buChar char="•"/>
-            </a:pPr>
-            <a:r>
-              <a:rPr lang="en-US" sz="1600" dirty="0"/>
-              <a:t>Discord channel:  </a:t>
-            </a:r>
-            <a:r>
-              <a:rPr lang="en-US" sz="1600" b="0" i="0" u="none" strike="noStrike" dirty="0">
-                <a:effectLst/>
-                <a:hlinkClick r:id="rId3"/>
-              </a:rPr>
-              <a:t>https://discord.gg/dmgKnM5DdA</a:t>
-            </a:r>
-            <a:endParaRPr lang="en-US" sz="1600" b="0" i="0" dirty="0">
-              <a:effectLst/>
-            </a:endParaRPr>
-          </a:p>
-          <a:p>
-            <a:pPr indent="-228600">
-              <a:buFont typeface="Arial" panose="020B0604020202020204" pitchFamily="34" charset="0"/>
-              <a:buChar char="•"/>
-            </a:pPr>
-            <a:endParaRPr lang="en-US" sz="1600" dirty="0"/>
-          </a:p>
-          <a:p>
-            <a:pPr indent="-228600">
-              <a:buFont typeface="Arial" panose="020B0604020202020204" pitchFamily="34" charset="0"/>
-              <a:buChar char="•"/>
-            </a:pPr>
-            <a:endParaRPr lang="en-US" sz="1600" dirty="0"/>
+            <a:endParaRPr lang="en-US" sz="1800" dirty="0"/>
+          </a:p>
+          <a:p>
+            <a:pPr algn="ctr"/>
+            <a:r>
+              <a:rPr lang="en-US" sz="1800" dirty="0"/>
+              <a:t>We used GitHub’s browser platform as well as GitHub Desktop for version control</a:t>
+            </a:r>
+          </a:p>
+          <a:p>
+            <a:pPr algn="ctr"/>
+            <a:endParaRPr lang="en-US" sz="1800" dirty="0"/>
           </a:p>
         </p:txBody>
       </p:sp>
       <p:pic>
         <p:nvPicPr>
-          <p:cNvPr id="7" name="Graphic 6" descr="Cycle with people with solid fill">
+          <p:cNvPr id="7" name="Graphic 6" descr="Network diagram with solid fill">
             <a:extLst>
               <a:ext uri="{FF2B5EF4-FFF2-40B4-BE49-F238E27FC236}">
-                <a16:creationId xmlns:a16="http://schemas.microsoft.com/office/drawing/2014/main" id="{B73008FB-338E-1E53-C199-D38293D6026E}"/>
+                <a16:creationId xmlns:a16="http://schemas.microsoft.com/office/drawing/2014/main" id="{EEC7949E-BFB5-182A-396B-B7FCE416F153}"/>
               </a:ext>
             </a:extLst>
           </p:cNvPr>
@@ -6754,13 +6555,13 @@
           <p:nvPr/>
         </p:nvPicPr>
         <p:blipFill>
-          <a:blip r:embed="rId4">
+          <a:blip r:embed="rId3">
             <a:extLst>
               <a:ext uri="{28A0092B-C50C-407E-A947-70E740481C1C}">
                 <a14:useLocalDpi xmlns:a14="http://schemas.microsoft.com/office/drawing/2010/main" val="0"/>
               </a:ext>
               <a:ext uri="{96DAC541-7B7A-43D3-8B79-37D633B846F1}">
-                <asvg:svgBlip xmlns:asvg="http://schemas.microsoft.com/office/drawing/2016/SVG/main" r:embed="rId5"/>
+                <asvg:svgBlip xmlns:asvg="http://schemas.microsoft.com/office/drawing/2016/SVG/main" r:embed="rId4"/>
               </a:ext>
             </a:extLst>
           </a:blip>
@@ -6769,18 +6570,127 @@
         </p:blipFill>
         <p:spPr>
           <a:xfrm>
-            <a:off x="7200900" y="2082302"/>
-            <a:ext cx="4011325" cy="4011325"/>
+            <a:off x="194421" y="1831336"/>
+            <a:ext cx="3758102" cy="3758102"/>
           </a:xfrm>
           <a:prstGeom prst="rect">
             <a:avLst/>
           </a:prstGeom>
         </p:spPr>
       </p:pic>
+      <p:sp>
+        <p:nvSpPr>
+          <p:cNvPr id="4" name="TextBox 3">
+            <a:extLst>
+              <a:ext uri="{FF2B5EF4-FFF2-40B4-BE49-F238E27FC236}">
+                <a16:creationId xmlns:a16="http://schemas.microsoft.com/office/drawing/2014/main" id="{95ABE48C-C297-AE8C-7450-AF3C2757C19C}"/>
+              </a:ext>
+            </a:extLst>
+          </p:cNvPr>
+          <p:cNvSpPr txBox="1"/>
+          <p:nvPr/>
+        </p:nvSpPr>
+        <p:spPr>
+          <a:xfrm>
+            <a:off x="4921496" y="2660473"/>
+            <a:ext cx="6887402" cy="1754326"/>
+          </a:xfrm>
+          <a:prstGeom prst="rect">
+            <a:avLst/>
+          </a:prstGeom>
+          <a:noFill/>
+          <a:ln>
+            <a:noFill/>
+          </a:ln>
+        </p:spPr>
+        <p:txBody>
+          <a:bodyPr wrap="square" rtlCol="0">
+            <a:spAutoFit/>
+          </a:bodyPr>
+          <a:lstStyle/>
+          <a:p>
+            <a:pPr algn="ctr"/>
+            <a:r>
+              <a:rPr lang="en-US" u="sng" dirty="0"/>
+              <a:t>Reasons we chose GitHub</a:t>
+            </a:r>
+          </a:p>
+          <a:p>
+            <a:pPr algn="ctr"/>
+            <a:r>
+              <a:rPr lang="en-US" dirty="0"/>
+              <a:t>Ease of Use</a:t>
+            </a:r>
+          </a:p>
+          <a:p>
+            <a:pPr algn="ctr"/>
+            <a:r>
+              <a:rPr lang="en-US" dirty="0"/>
+              <a:t>Quick updates for rest of team</a:t>
+            </a:r>
+          </a:p>
+          <a:p>
+            <a:pPr algn="ctr"/>
+            <a:r>
+              <a:rPr lang="en-US" dirty="0"/>
+              <a:t>Ability to work on code independently</a:t>
+            </a:r>
+          </a:p>
+          <a:p>
+            <a:pPr algn="ctr"/>
+            <a:r>
+              <a:rPr lang="en-US" dirty="0"/>
+              <a:t>Branching capabilities to try different methods of fixing the same problem simultaneously</a:t>
+            </a:r>
+          </a:p>
+        </p:txBody>
+      </p:sp>
+      <p:sp>
+        <p:nvSpPr>
+          <p:cNvPr id="17" name="TextBox 16">
+            <a:extLst>
+              <a:ext uri="{FF2B5EF4-FFF2-40B4-BE49-F238E27FC236}">
+                <a16:creationId xmlns:a16="http://schemas.microsoft.com/office/drawing/2014/main" id="{E4A0172A-C24D-E2FF-3D87-9C1B2A7E38D6}"/>
+              </a:ext>
+            </a:extLst>
+          </p:cNvPr>
+          <p:cNvSpPr txBox="1"/>
+          <p:nvPr/>
+        </p:nvSpPr>
+        <p:spPr>
+          <a:xfrm>
+            <a:off x="4921496" y="4657374"/>
+            <a:ext cx="6887402" cy="323165"/>
+          </a:xfrm>
+          <a:prstGeom prst="rect">
+            <a:avLst/>
+          </a:prstGeom>
+          <a:noFill/>
+        </p:spPr>
+        <p:txBody>
+          <a:bodyPr wrap="square" rtlCol="0">
+            <a:spAutoFit/>
+          </a:bodyPr>
+          <a:lstStyle/>
+          <a:p>
+            <a:r>
+              <a:rPr lang="en-US" sz="1500" dirty="0"/>
+              <a:t>Project Repository:  </a:t>
+            </a:r>
+            <a:r>
+              <a:rPr lang="en-US" sz="1500" u="sng" dirty="0">
+                <a:hlinkClick r:id="rId5"/>
+              </a:rPr>
+              <a:t>https://github.com/rodu4835/CSPB_3308_Team_3</a:t>
+            </a:r>
+            <a:endParaRPr lang="en-US" sz="1500" dirty="0"/>
+          </a:p>
+        </p:txBody>
+      </p:sp>
     </p:spTree>
     <p:extLst>
       <p:ext uri="{BB962C8B-B14F-4D97-AF65-F5344CB8AC3E}">
-        <p14:creationId xmlns:p14="http://schemas.microsoft.com/office/powerpoint/2010/main" val="1036318350"/>
+        <p14:creationId xmlns:p14="http://schemas.microsoft.com/office/powerpoint/2010/main" val="3292648982"/>
       </p:ext>
     </p:extLst>
   </p:cSld>
@@ -6815,6 +6725,51 @@
           <a:chExt cx="0" cy="0"/>
         </a:xfrm>
       </p:grpSpPr>
+      <p:pic>
+        <p:nvPicPr>
+          <p:cNvPr id="16" name="Picture 9">
+            <a:extLst>
+              <a:ext uri="{FF2B5EF4-FFF2-40B4-BE49-F238E27FC236}">
+                <a16:creationId xmlns:a16="http://schemas.microsoft.com/office/drawing/2014/main" id="{BDFADFB3-3D44-49A8-AE3B-A87C61607F7E}"/>
+              </a:ext>
+              <a:ext uri="{C183D7F6-B498-43B3-948B-1728B52AA6E4}">
+                <adec:decorative xmlns:adec="http://schemas.microsoft.com/office/drawing/2017/decorative" val="1"/>
+              </a:ext>
+            </a:extLst>
+          </p:cNvPr>
+          <p:cNvPicPr>
+            <a:picLocks noGrp="1" noRot="1" noChangeAspect="1" noMove="1" noResize="1" noEditPoints="1" noAdjustHandles="1" noChangeArrowheads="1" noChangeShapeType="1" noCrop="1"/>
+          </p:cNvPicPr>
+          <p:nvPr>
+            <p:extLst>
+              <p:ext uri="{386F3935-93C4-4BCD-93E2-E3B085C9AB24}">
+                <p16:designElem xmlns:p16="http://schemas.microsoft.com/office/powerpoint/2015/main" val="1"/>
+              </p:ext>
+            </p:extLst>
+          </p:nvPr>
+        </p:nvPicPr>
+        <p:blipFill>
+          <a:blip r:embed="rId2">
+            <a:extLst>
+              <a:ext uri="{28A0092B-C50C-407E-A947-70E740481C1C}">
+                <a14:useLocalDpi xmlns:a14="http://schemas.microsoft.com/office/drawing/2010/main" val="0"/>
+              </a:ext>
+            </a:extLst>
+          </a:blip>
+          <a:stretch>
+            <a:fillRect/>
+          </a:stretch>
+        </p:blipFill>
+        <p:spPr>
+          <a:xfrm>
+            <a:off x="0" y="0"/>
+            <a:ext cx="12192000" cy="1441450"/>
+          </a:xfrm>
+          <a:prstGeom prst="rect">
+            <a:avLst/>
+          </a:prstGeom>
+        </p:spPr>
+      </p:pic>
       <p:sp>
         <p:nvSpPr>
           <p:cNvPr id="2" name="Title 1">
@@ -6833,29 +6788,28 @@
         </p:nvSpPr>
         <p:spPr>
           <a:xfrm>
-            <a:off x="1463040" y="685800"/>
-            <a:ext cx="7935718" cy="1108166"/>
-          </a:xfrm>
-        </p:spPr>
-        <p:txBody>
-          <a:bodyPr vert="horz" lIns="91440" tIns="45720" rIns="91440" bIns="45720" rtlCol="0" anchor="t">
-            <a:normAutofit fontScale="90000"/>
+            <a:off x="2895600" y="764373"/>
+            <a:ext cx="8610600" cy="1293028"/>
+          </a:xfrm>
+        </p:spPr>
+        <p:txBody>
+          <a:bodyPr vert="horz" lIns="91440" tIns="45720" rIns="91440" bIns="45720" rtlCol="0" anchor="ctr">
+            <a:normAutofit/>
           </a:bodyPr>
           <a:lstStyle/>
           <a:p>
-            <a:pPr algn="l"/>
-            <a:r>
-              <a:rPr lang="en-US" sz="5000" dirty="0"/>
-              <a:t>Other Tools Learned in 3308</a:t>
-            </a:r>
-            <a:endParaRPr lang="en-US" sz="5000" kern="1200" dirty="0">
-              <a:solidFill>
-                <a:schemeClr val="tx1"/>
-              </a:solidFill>
-              <a:latin typeface="+mj-lt"/>
-              <a:ea typeface="+mj-ea"/>
-              <a:cs typeface="+mj-cs"/>
-            </a:endParaRPr>
+            <a:pPr algn="r"/>
+            <a:r>
+              <a:rPr lang="en-US" sz="4000" kern="1200" cap="all" baseline="0" dirty="0">
+                <a:solidFill>
+                  <a:schemeClr val="tx1"/>
+                </a:solidFill>
+                <a:latin typeface="+mj-lt"/>
+                <a:ea typeface="+mj-ea"/>
+                <a:cs typeface="+mj-cs"/>
+              </a:rPr>
+              <a:t>Agile Development and communication</a:t>
+            </a:r>
           </a:p>
         </p:txBody>
       </p:sp>
@@ -6877,8 +6831,8 @@
         </p:nvSpPr>
         <p:spPr>
           <a:xfrm>
-            <a:off x="1463040" y="2479766"/>
-            <a:ext cx="7935718" cy="3400580"/>
+            <a:off x="677333" y="2194560"/>
+            <a:ext cx="5816600" cy="4024125"/>
           </a:xfrm>
         </p:spPr>
         <p:txBody>
@@ -6887,62 +6841,133 @@
           </a:bodyPr>
           <a:lstStyle/>
           <a:p>
-            <a:pPr indent="-228600" algn="l">
+            <a:pPr indent="-228600">
               <a:buFont typeface="Arial" panose="020B0604020202020204" pitchFamily="34" charset="0"/>
               <a:buChar char="•"/>
             </a:pPr>
             <a:r>
-              <a:rPr lang="en-US" dirty="0"/>
-              <a:t>We initially thought about using Flask in combination with Python</a:t>
-            </a:r>
-          </a:p>
-          <a:p>
-            <a:pPr indent="-228600" algn="l">
+              <a:rPr lang="en-US" sz="1600" dirty="0"/>
+              <a:t>We began the semester using standard Scrum method, with standup meetings and Jordan Sims acting as Scrum Master</a:t>
+            </a:r>
+          </a:p>
+          <a:p>
+            <a:pPr indent="-228600">
               <a:buFont typeface="Arial" panose="020B0604020202020204" pitchFamily="34" charset="0"/>
               <a:buChar char="•"/>
             </a:pPr>
             <a:r>
-              <a:rPr lang="en-US" dirty="0"/>
-              <a:t>We choose, however, to use JavaScript and HTML/CSS instead after reaching those portions of the course</a:t>
-            </a:r>
-          </a:p>
-          <a:p>
-            <a:pPr indent="-228600" algn="l">
+              <a:rPr lang="en-US" sz="1600" dirty="0"/>
+              <a:t>With four team members in four time zones, we realized early on that we were more productive having continual discussion via text messaging in Discord  </a:t>
+            </a:r>
+          </a:p>
+          <a:p>
+            <a:pPr indent="-228600">
               <a:buFont typeface="Arial" panose="020B0604020202020204" pitchFamily="34" charset="0"/>
               <a:buChar char="•"/>
             </a:pPr>
             <a:r>
-              <a:rPr lang="en-US" dirty="0"/>
-              <a:t>We did not include a database for this project because, as constituted, the game did not store data</a:t>
-            </a:r>
-          </a:p>
-          <a:p>
-            <a:pPr indent="-228600" algn="l">
+              <a:rPr lang="en-US" sz="1600" dirty="0"/>
+              <a:t>We created a channel for Team 3 and discussed the project regularly in that format  </a:t>
+            </a:r>
+          </a:p>
+          <a:p>
+            <a:pPr indent="-228600">
               <a:buFont typeface="Arial" panose="020B0604020202020204" pitchFamily="34" charset="0"/>
               <a:buChar char="•"/>
             </a:pPr>
             <a:r>
-              <a:rPr lang="en-US" dirty="0"/>
-              <a:t>If we were to continue building the game out and create additional features like a leaderboard, we could use SQL</a:t>
-            </a:r>
-          </a:p>
-          <a:p>
-            <a:pPr indent="-228600" algn="l">
+              <a:rPr lang="en-US" sz="1600" dirty="0"/>
+              <a:t>We also accumulated checklist items that the members would volunteer to take on and report progress via the Discord channel  </a:t>
+            </a:r>
+          </a:p>
+          <a:p>
+            <a:pPr indent="-228600">
               <a:buFont typeface="Arial" panose="020B0604020202020204" pitchFamily="34" charset="0"/>
               <a:buChar char="•"/>
             </a:pPr>
-            <a:endParaRPr lang="en-US" sz="1800" dirty="0"/>
-          </a:p>
-          <a:p>
-            <a:pPr algn="l"/>
-            <a:endParaRPr lang="en-US" sz="1800" dirty="0"/>
-          </a:p>
-        </p:txBody>
-      </p:sp>
+            <a:r>
+              <a:rPr lang="en-US" sz="1600" dirty="0"/>
+              <a:t>We held “in-person“ video meetings as needed to promote progress and assess project goals</a:t>
+            </a:r>
+          </a:p>
+          <a:p>
+            <a:pPr indent="-228600">
+              <a:buFont typeface="Arial" panose="020B0604020202020204" pitchFamily="34" charset="0"/>
+              <a:buChar char="•"/>
+            </a:pPr>
+            <a:r>
+              <a:rPr lang="en-US" sz="1600" dirty="0"/>
+              <a:t>Discord channel:  </a:t>
+            </a:r>
+            <a:r>
+              <a:rPr lang="en-US" sz="1600" b="0" i="0" u="none" strike="noStrike" dirty="0">
+                <a:effectLst/>
+                <a:hlinkClick r:id="rId3"/>
+              </a:rPr>
+              <a:t>https://discord.gg/dmgKnM5DdA</a:t>
+            </a:r>
+            <a:endParaRPr lang="en-US" sz="1600" b="0" i="0" dirty="0">
+              <a:effectLst/>
+            </a:endParaRPr>
+          </a:p>
+          <a:p>
+            <a:pPr indent="-228600">
+              <a:buFont typeface="Arial" panose="020B0604020202020204" pitchFamily="34" charset="0"/>
+              <a:buChar char="•"/>
+            </a:pPr>
+            <a:endParaRPr lang="en-US" sz="1600" dirty="0"/>
+          </a:p>
+          <a:p>
+            <a:pPr indent="-228600">
+              <a:buFont typeface="Arial" panose="020B0604020202020204" pitchFamily="34" charset="0"/>
+              <a:buChar char="•"/>
+            </a:pPr>
+            <a:endParaRPr lang="en-US" sz="1600" dirty="0"/>
+          </a:p>
+        </p:txBody>
+      </p:sp>
+      <p:pic>
+        <p:nvPicPr>
+          <p:cNvPr id="7" name="Graphic 6" descr="Cycle with people with solid fill">
+            <a:extLst>
+              <a:ext uri="{FF2B5EF4-FFF2-40B4-BE49-F238E27FC236}">
+                <a16:creationId xmlns:a16="http://schemas.microsoft.com/office/drawing/2014/main" id="{B73008FB-338E-1E53-C199-D38293D6026E}"/>
+              </a:ext>
+            </a:extLst>
+          </p:cNvPr>
+          <p:cNvPicPr>
+            <a:picLocks noChangeAspect="1"/>
+          </p:cNvPicPr>
+          <p:nvPr/>
+        </p:nvPicPr>
+        <p:blipFill>
+          <a:blip r:embed="rId4">
+            <a:extLst>
+              <a:ext uri="{28A0092B-C50C-407E-A947-70E740481C1C}">
+                <a14:useLocalDpi xmlns:a14="http://schemas.microsoft.com/office/drawing/2010/main" val="0"/>
+              </a:ext>
+              <a:ext uri="{96DAC541-7B7A-43D3-8B79-37D633B846F1}">
+                <asvg:svgBlip xmlns:asvg="http://schemas.microsoft.com/office/drawing/2016/SVG/main" r:embed="rId5"/>
+              </a:ext>
+            </a:extLst>
+          </a:blip>
+          <a:srcRect/>
+          <a:stretch/>
+        </p:blipFill>
+        <p:spPr>
+          <a:xfrm>
+            <a:off x="7200900" y="2082302"/>
+            <a:ext cx="4011325" cy="4011325"/>
+          </a:xfrm>
+          <a:prstGeom prst="rect">
+            <a:avLst/>
+          </a:prstGeom>
+        </p:spPr>
+      </p:pic>
     </p:spTree>
     <p:extLst>
       <p:ext uri="{BB962C8B-B14F-4D97-AF65-F5344CB8AC3E}">
-        <p14:creationId xmlns:p14="http://schemas.microsoft.com/office/powerpoint/2010/main" val="3862360880"/>
+        <p14:creationId xmlns:p14="http://schemas.microsoft.com/office/powerpoint/2010/main" val="1036318350"/>
       </p:ext>
     </p:extLst>
   </p:cSld>
@@ -6955,6 +6980,14 @@
 <file path=ppt/slides/slide15.xml><?xml version="1.0" encoding="utf-8"?>
 <p:sld xmlns:a="http://schemas.openxmlformats.org/drawingml/2006/main" xmlns:r="http://schemas.openxmlformats.org/officeDocument/2006/relationships" xmlns:p="http://schemas.openxmlformats.org/presentationml/2006/main">
   <p:cSld>
+    <p:bg>
+      <p:bgPr>
+        <a:solidFill>
+          <a:schemeClr val="bg1"/>
+        </a:solidFill>
+        <a:effectLst/>
+      </p:bgPr>
+    </p:bg>
     <p:spTree>
       <p:nvGrpSpPr>
         <p:cNvPr id="1" name=""/>
@@ -6971,10 +7004,10 @@
       </p:grpSpPr>
       <p:sp>
         <p:nvSpPr>
-          <p:cNvPr id="4" name="Title 3">
+          <p:cNvPr id="2" name="Title 1">
             <a:extLst>
               <a:ext uri="{FF2B5EF4-FFF2-40B4-BE49-F238E27FC236}">
-                <a16:creationId xmlns:a16="http://schemas.microsoft.com/office/drawing/2014/main" id="{C3EFEC59-EEDE-CD8F-1E91-4777E7565990}"/>
+                <a16:creationId xmlns:a16="http://schemas.microsoft.com/office/drawing/2014/main" id="{81488890-FF45-40AA-8B13-E0941EC28271}"/>
               </a:ext>
             </a:extLst>
           </p:cNvPr>
@@ -6982,50 +7015,121 @@
             <a:spLocks noGrp="1"/>
           </p:cNvSpPr>
           <p:nvPr>
-            <p:ph type="title"/>
-          </p:nvPr>
-        </p:nvSpPr>
-        <p:spPr/>
-        <p:txBody>
-          <a:bodyPr/>
-          <a:lstStyle/>
-          <a:p>
+            <p:ph type="ctrTitle"/>
+          </p:nvPr>
+        </p:nvSpPr>
+        <p:spPr>
+          <a:xfrm>
+            <a:off x="1463040" y="685800"/>
+            <a:ext cx="7935718" cy="1108166"/>
+          </a:xfrm>
+        </p:spPr>
+        <p:txBody>
+          <a:bodyPr vert="horz" lIns="91440" tIns="45720" rIns="91440" bIns="45720" rtlCol="0" anchor="t">
+            <a:normAutofit fontScale="90000"/>
+          </a:bodyPr>
+          <a:lstStyle/>
+          <a:p>
+            <a:pPr algn="l"/>
+            <a:r>
+              <a:rPr lang="en-US" sz="5000" dirty="0"/>
+              <a:t>Other Tools Learned in 3308</a:t>
+            </a:r>
+            <a:endParaRPr lang="en-US" sz="5000" kern="1200" dirty="0">
+              <a:solidFill>
+                <a:schemeClr val="tx1"/>
+              </a:solidFill>
+              <a:latin typeface="+mj-lt"/>
+              <a:ea typeface="+mj-ea"/>
+              <a:cs typeface="+mj-cs"/>
+            </a:endParaRPr>
+          </a:p>
+        </p:txBody>
+      </p:sp>
+      <p:sp>
+        <p:nvSpPr>
+          <p:cNvPr id="3" name="Subtitle 2">
+            <a:extLst>
+              <a:ext uri="{FF2B5EF4-FFF2-40B4-BE49-F238E27FC236}">
+                <a16:creationId xmlns:a16="http://schemas.microsoft.com/office/drawing/2014/main" id="{59BD3E99-0796-496A-BCDB-1B3AD99472B3}"/>
+              </a:ext>
+            </a:extLst>
+          </p:cNvPr>
+          <p:cNvSpPr>
+            <a:spLocks noGrp="1"/>
+          </p:cNvSpPr>
+          <p:nvPr>
+            <p:ph type="subTitle" idx="1"/>
+          </p:nvPr>
+        </p:nvSpPr>
+        <p:spPr>
+          <a:xfrm>
+            <a:off x="1463040" y="2479766"/>
+            <a:ext cx="7935718" cy="3400580"/>
+          </a:xfrm>
+        </p:spPr>
+        <p:txBody>
+          <a:bodyPr vert="horz" lIns="91440" tIns="45720" rIns="91440" bIns="45720" rtlCol="0">
+            <a:normAutofit/>
+          </a:bodyPr>
+          <a:lstStyle/>
+          <a:p>
+            <a:pPr indent="-228600" algn="l">
+              <a:buFont typeface="Arial" panose="020B0604020202020204" pitchFamily="34" charset="0"/>
+              <a:buChar char="•"/>
+            </a:pPr>
             <a:r>
               <a:rPr lang="en-US" dirty="0"/>
-              <a:t>Design Challenges</a:t>
-            </a:r>
-          </a:p>
-        </p:txBody>
-      </p:sp>
-      <p:sp>
-        <p:nvSpPr>
-          <p:cNvPr id="5" name="Text Placeholder 4">
-            <a:extLst>
-              <a:ext uri="{FF2B5EF4-FFF2-40B4-BE49-F238E27FC236}">
-                <a16:creationId xmlns:a16="http://schemas.microsoft.com/office/drawing/2014/main" id="{6C0BBC30-5DB8-8599-5E2D-991BFF0D8509}"/>
-              </a:ext>
-            </a:extLst>
-          </p:cNvPr>
-          <p:cNvSpPr>
-            <a:spLocks noGrp="1"/>
-          </p:cNvSpPr>
-          <p:nvPr>
-            <p:ph type="body" idx="1"/>
-          </p:nvPr>
-        </p:nvSpPr>
-        <p:spPr/>
-        <p:txBody>
-          <a:bodyPr/>
-          <a:lstStyle/>
-          <a:p>
-            <a:endParaRPr lang="en-US"/>
+              <a:t>We initially thought about using Flask in combination with Python</a:t>
+            </a:r>
+          </a:p>
+          <a:p>
+            <a:pPr indent="-228600" algn="l">
+              <a:buFont typeface="Arial" panose="020B0604020202020204" pitchFamily="34" charset="0"/>
+              <a:buChar char="•"/>
+            </a:pPr>
+            <a:r>
+              <a:rPr lang="en-US" dirty="0"/>
+              <a:t>We choose, however, to use JavaScript and HTML/CSS instead after reaching those portions of the course</a:t>
+            </a:r>
+          </a:p>
+          <a:p>
+            <a:pPr indent="-228600" algn="l">
+              <a:buFont typeface="Arial" panose="020B0604020202020204" pitchFamily="34" charset="0"/>
+              <a:buChar char="•"/>
+            </a:pPr>
+            <a:r>
+              <a:rPr lang="en-US" dirty="0"/>
+              <a:t>We did not include a database for this project because, as constituted, the game did not store data</a:t>
+            </a:r>
+          </a:p>
+          <a:p>
+            <a:pPr indent="-228600" algn="l">
+              <a:buFont typeface="Arial" panose="020B0604020202020204" pitchFamily="34" charset="0"/>
+              <a:buChar char="•"/>
+            </a:pPr>
+            <a:r>
+              <a:rPr lang="en-US" dirty="0"/>
+              <a:t>If we were to continue building the game out and create additional features like a leaderboard, we could use SQL</a:t>
+            </a:r>
+          </a:p>
+          <a:p>
+            <a:pPr indent="-228600" algn="l">
+              <a:buFont typeface="Arial" panose="020B0604020202020204" pitchFamily="34" charset="0"/>
+              <a:buChar char="•"/>
+            </a:pPr>
+            <a:endParaRPr lang="en-US" sz="1800" dirty="0"/>
+          </a:p>
+          <a:p>
+            <a:pPr algn="l"/>
+            <a:endParaRPr lang="en-US" sz="1800" dirty="0"/>
           </a:p>
         </p:txBody>
       </p:sp>
     </p:spTree>
     <p:extLst>
       <p:ext uri="{BB962C8B-B14F-4D97-AF65-F5344CB8AC3E}">
-        <p14:creationId xmlns:p14="http://schemas.microsoft.com/office/powerpoint/2010/main" val="2719920505"/>
+        <p14:creationId xmlns:p14="http://schemas.microsoft.com/office/powerpoint/2010/main" val="3862360880"/>
       </p:ext>
     </p:extLst>
   </p:cSld>
@@ -7054,10 +7158,10 @@
       </p:grpSpPr>
       <p:sp>
         <p:nvSpPr>
-          <p:cNvPr id="2" name="Title 1">
+          <p:cNvPr id="4" name="Title 3">
             <a:extLst>
               <a:ext uri="{FF2B5EF4-FFF2-40B4-BE49-F238E27FC236}">
-                <a16:creationId xmlns:a16="http://schemas.microsoft.com/office/drawing/2014/main" id="{81488890-FF45-40AA-8B13-E0941EC28271}"/>
+                <a16:creationId xmlns:a16="http://schemas.microsoft.com/office/drawing/2014/main" id="{C3EFEC59-EEDE-CD8F-1E91-4777E7565990}"/>
               </a:ext>
             </a:extLst>
           </p:cNvPr>
@@ -7065,43 +7169,27 @@
             <a:spLocks noGrp="1"/>
           </p:cNvSpPr>
           <p:nvPr>
-            <p:ph type="ctrTitle"/>
-          </p:nvPr>
-        </p:nvSpPr>
-        <p:spPr>
-          <a:xfrm>
-            <a:off x="1463040" y="685800"/>
-            <a:ext cx="7935718" cy="1108166"/>
-          </a:xfrm>
-        </p:spPr>
-        <p:txBody>
-          <a:bodyPr vert="horz" lIns="91440" tIns="45720" rIns="91440" bIns="45720" rtlCol="0" anchor="t">
-            <a:normAutofit/>
-          </a:bodyPr>
-          <a:lstStyle/>
-          <a:p>
-            <a:pPr algn="l"/>
-            <a:r>
-              <a:rPr lang="en-US" sz="4200" dirty="0"/>
-              <a:t>Challenges and changes</a:t>
-            </a:r>
-            <a:endParaRPr lang="en-US" sz="4200" kern="1200" dirty="0">
-              <a:solidFill>
-                <a:schemeClr val="tx1"/>
-              </a:solidFill>
-              <a:latin typeface="+mj-lt"/>
-              <a:ea typeface="+mj-ea"/>
-              <a:cs typeface="+mj-cs"/>
-            </a:endParaRPr>
-          </a:p>
-        </p:txBody>
-      </p:sp>
-      <p:sp>
-        <p:nvSpPr>
-          <p:cNvPr id="3" name="Subtitle 2">
+            <p:ph type="title"/>
+          </p:nvPr>
+        </p:nvSpPr>
+        <p:spPr/>
+        <p:txBody>
+          <a:bodyPr/>
+          <a:lstStyle/>
+          <a:p>
+            <a:r>
+              <a:rPr lang="en-US" dirty="0"/>
+              <a:t>Design Challenges</a:t>
+            </a:r>
+          </a:p>
+        </p:txBody>
+      </p:sp>
+      <p:sp>
+        <p:nvSpPr>
+          <p:cNvPr id="5" name="Text Placeholder 4">
             <a:extLst>
               <a:ext uri="{FF2B5EF4-FFF2-40B4-BE49-F238E27FC236}">
-                <a16:creationId xmlns:a16="http://schemas.microsoft.com/office/drawing/2014/main" id="{59BD3E99-0796-496A-BCDB-1B3AD99472B3}"/>
+                <a16:creationId xmlns:a16="http://schemas.microsoft.com/office/drawing/2014/main" id="{6C0BBC30-5DB8-8599-5E2D-991BFF0D8509}"/>
               </a:ext>
             </a:extLst>
           </p:cNvPr>
@@ -7109,139 +7197,22 @@
             <a:spLocks noGrp="1"/>
           </p:cNvSpPr>
           <p:nvPr>
-            <p:ph type="subTitle" idx="1"/>
-          </p:nvPr>
-        </p:nvSpPr>
-        <p:spPr>
-          <a:xfrm>
-            <a:off x="1463040" y="1586047"/>
-            <a:ext cx="7585167" cy="3947162"/>
-          </a:xfrm>
-        </p:spPr>
-        <p:txBody>
-          <a:bodyPr vert="horz" lIns="91440" tIns="45720" rIns="91440" bIns="45720" rtlCol="0">
-            <a:normAutofit fontScale="40000" lnSpcReduction="20000"/>
-          </a:bodyPr>
-          <a:lstStyle/>
-          <a:p>
-            <a:pPr indent="-228600" algn="l">
-              <a:buFont typeface="Arial" panose="020B0604020202020204" pitchFamily="34" charset="0"/>
-              <a:buChar char="•"/>
-            </a:pPr>
-            <a:r>
-              <a:rPr lang="en-US" sz="4800" dirty="0"/>
-              <a:t>Building the Plane While Flying It</a:t>
-            </a:r>
-          </a:p>
-          <a:p>
-            <a:pPr lvl="1" indent="-228600" algn="l">
-              <a:lnSpc>
-                <a:spcPct val="110000"/>
-              </a:lnSpc>
-              <a:spcBef>
-                <a:spcPts val="1000"/>
-              </a:spcBef>
-              <a:buFont typeface="Arial" panose="020B0604020202020204" pitchFamily="34" charset="0"/>
-              <a:buChar char="•"/>
-            </a:pPr>
-            <a:r>
-              <a:rPr lang="en-US" sz="3500" dirty="0"/>
-              <a:t>The team had experience with Python coming into the course, but none with JavaScript</a:t>
-            </a:r>
-          </a:p>
-          <a:p>
-            <a:pPr lvl="1" indent="-228600" algn="l">
-              <a:lnSpc>
-                <a:spcPct val="110000"/>
-              </a:lnSpc>
-              <a:spcBef>
-                <a:spcPts val="1000"/>
-              </a:spcBef>
-              <a:buFont typeface="Arial" panose="020B0604020202020204" pitchFamily="34" charset="0"/>
-              <a:buChar char="•"/>
-            </a:pPr>
-            <a:r>
-              <a:rPr lang="en-US" sz="3500" dirty="0"/>
-              <a:t>We initially developed the game and its features in Python, anticipating that we would use Flask for the front-end</a:t>
-            </a:r>
-          </a:p>
-          <a:p>
-            <a:pPr lvl="1" indent="-228600" algn="l">
-              <a:lnSpc>
-                <a:spcPct val="110000"/>
-              </a:lnSpc>
-              <a:spcBef>
-                <a:spcPts val="1000"/>
-              </a:spcBef>
-              <a:buFont typeface="Arial" panose="020B0604020202020204" pitchFamily="34" charset="0"/>
-              <a:buChar char="•"/>
-            </a:pPr>
-            <a:r>
-              <a:rPr lang="en-US" sz="3500" dirty="0"/>
-              <a:t>Upon reaching the JavaScript portion of the course, we determined that we could integrate HTML/CSS with JavaScript in a cleaner way</a:t>
-            </a:r>
-          </a:p>
-          <a:p>
-            <a:pPr lvl="1" indent="-228600" algn="l">
-              <a:lnSpc>
-                <a:spcPct val="110000"/>
-              </a:lnSpc>
-              <a:spcBef>
-                <a:spcPts val="1000"/>
-              </a:spcBef>
-              <a:buFont typeface="Arial" panose="020B0604020202020204" pitchFamily="34" charset="0"/>
-              <a:buChar char="•"/>
-            </a:pPr>
-            <a:r>
-              <a:rPr lang="en-US" sz="3500" dirty="0"/>
-              <a:t>Translating the existing Python code into JavaScript was time-consuming, and some features that were useful in Python but less so in JavaScript fell away</a:t>
-            </a:r>
-          </a:p>
-          <a:p>
-            <a:pPr indent="-228600">
-              <a:lnSpc>
-                <a:spcPct val="110000"/>
-              </a:lnSpc>
-              <a:buFont typeface="Arial" panose="020B0604020202020204" pitchFamily="34" charset="0"/>
-              <a:buChar char="•"/>
-            </a:pPr>
-            <a:r>
-              <a:rPr lang="en-US" sz="4800" dirty="0"/>
-              <a:t>Coordinating Efforts</a:t>
-            </a:r>
-          </a:p>
-          <a:p>
-            <a:pPr lvl="1" indent="-228600" algn="l">
-              <a:lnSpc>
-                <a:spcPct val="110000"/>
-              </a:lnSpc>
-              <a:buFont typeface="Arial" panose="020B0604020202020204" pitchFamily="34" charset="0"/>
-              <a:buChar char="•"/>
-            </a:pPr>
-            <a:r>
-              <a:rPr lang="en-US" sz="3500" dirty="0"/>
-              <a:t>Coordinating meetings across four different time zones was challenging and led the team to modify its Scrum approach to rely more on messaging in Discord to drive the project forward</a:t>
-            </a:r>
-          </a:p>
-          <a:p>
-            <a:pPr lvl="1" indent="-228600" algn="l">
-              <a:lnSpc>
-                <a:spcPct val="110000"/>
-              </a:lnSpc>
-              <a:buFont typeface="Arial" panose="020B0604020202020204" pitchFamily="34" charset="0"/>
-              <a:buChar char="•"/>
-            </a:pPr>
-            <a:r>
-              <a:rPr lang="en-US" sz="3500" dirty="0"/>
-              <a:t>Team members had different levels of comfort with various tools (HTML/CSS and Heroku in particular)</a:t>
-            </a:r>
+            <p:ph type="body" idx="1"/>
+          </p:nvPr>
+        </p:nvSpPr>
+        <p:spPr/>
+        <p:txBody>
+          <a:bodyPr/>
+          <a:lstStyle/>
+          <a:p>
+            <a:endParaRPr lang="en-US"/>
           </a:p>
         </p:txBody>
       </p:sp>
     </p:spTree>
     <p:extLst>
       <p:ext uri="{BB962C8B-B14F-4D97-AF65-F5344CB8AC3E}">
-        <p14:creationId xmlns:p14="http://schemas.microsoft.com/office/powerpoint/2010/main" val="3726590022"/>
+        <p14:creationId xmlns:p14="http://schemas.microsoft.com/office/powerpoint/2010/main" val="2719920505"/>
       </p:ext>
     </p:extLst>
   </p:cSld>
@@ -7270,6 +7241,222 @@
       </p:grpSpPr>
       <p:sp>
         <p:nvSpPr>
+          <p:cNvPr id="2" name="Title 1">
+            <a:extLst>
+              <a:ext uri="{FF2B5EF4-FFF2-40B4-BE49-F238E27FC236}">
+                <a16:creationId xmlns:a16="http://schemas.microsoft.com/office/drawing/2014/main" id="{81488890-FF45-40AA-8B13-E0941EC28271}"/>
+              </a:ext>
+            </a:extLst>
+          </p:cNvPr>
+          <p:cNvSpPr>
+            <a:spLocks noGrp="1"/>
+          </p:cNvSpPr>
+          <p:nvPr>
+            <p:ph type="ctrTitle"/>
+          </p:nvPr>
+        </p:nvSpPr>
+        <p:spPr>
+          <a:xfrm>
+            <a:off x="1463040" y="685800"/>
+            <a:ext cx="7935718" cy="1108166"/>
+          </a:xfrm>
+        </p:spPr>
+        <p:txBody>
+          <a:bodyPr vert="horz" lIns="91440" tIns="45720" rIns="91440" bIns="45720" rtlCol="0" anchor="t">
+            <a:normAutofit/>
+          </a:bodyPr>
+          <a:lstStyle/>
+          <a:p>
+            <a:pPr algn="l"/>
+            <a:r>
+              <a:rPr lang="en-US" sz="4200" dirty="0"/>
+              <a:t>Challenges and changes</a:t>
+            </a:r>
+            <a:endParaRPr lang="en-US" sz="4200" kern="1200" dirty="0">
+              <a:solidFill>
+                <a:schemeClr val="tx1"/>
+              </a:solidFill>
+              <a:latin typeface="+mj-lt"/>
+              <a:ea typeface="+mj-ea"/>
+              <a:cs typeface="+mj-cs"/>
+            </a:endParaRPr>
+          </a:p>
+        </p:txBody>
+      </p:sp>
+      <p:sp>
+        <p:nvSpPr>
+          <p:cNvPr id="3" name="Subtitle 2">
+            <a:extLst>
+              <a:ext uri="{FF2B5EF4-FFF2-40B4-BE49-F238E27FC236}">
+                <a16:creationId xmlns:a16="http://schemas.microsoft.com/office/drawing/2014/main" id="{59BD3E99-0796-496A-BCDB-1B3AD99472B3}"/>
+              </a:ext>
+            </a:extLst>
+          </p:cNvPr>
+          <p:cNvSpPr>
+            <a:spLocks noGrp="1"/>
+          </p:cNvSpPr>
+          <p:nvPr>
+            <p:ph type="subTitle" idx="1"/>
+          </p:nvPr>
+        </p:nvSpPr>
+        <p:spPr>
+          <a:xfrm>
+            <a:off x="1463040" y="1586047"/>
+            <a:ext cx="7585167" cy="3947162"/>
+          </a:xfrm>
+        </p:spPr>
+        <p:txBody>
+          <a:bodyPr vert="horz" lIns="91440" tIns="45720" rIns="91440" bIns="45720" rtlCol="0">
+            <a:normAutofit fontScale="40000" lnSpcReduction="20000"/>
+          </a:bodyPr>
+          <a:lstStyle/>
+          <a:p>
+            <a:pPr indent="-228600" algn="l">
+              <a:buFont typeface="Arial" panose="020B0604020202020204" pitchFamily="34" charset="0"/>
+              <a:buChar char="•"/>
+            </a:pPr>
+            <a:r>
+              <a:rPr lang="en-US" sz="4800" dirty="0"/>
+              <a:t>Building the Plane While Flying It</a:t>
+            </a:r>
+          </a:p>
+          <a:p>
+            <a:pPr lvl="1" indent="-228600" algn="l">
+              <a:lnSpc>
+                <a:spcPct val="110000"/>
+              </a:lnSpc>
+              <a:spcBef>
+                <a:spcPts val="1000"/>
+              </a:spcBef>
+              <a:buFont typeface="Arial" panose="020B0604020202020204" pitchFamily="34" charset="0"/>
+              <a:buChar char="•"/>
+            </a:pPr>
+            <a:r>
+              <a:rPr lang="en-US" sz="3500" dirty="0"/>
+              <a:t>The team had experience with Python coming into the course, but none with JavaScript</a:t>
+            </a:r>
+          </a:p>
+          <a:p>
+            <a:pPr lvl="1" indent="-228600" algn="l">
+              <a:lnSpc>
+                <a:spcPct val="110000"/>
+              </a:lnSpc>
+              <a:spcBef>
+                <a:spcPts val="1000"/>
+              </a:spcBef>
+              <a:buFont typeface="Arial" panose="020B0604020202020204" pitchFamily="34" charset="0"/>
+              <a:buChar char="•"/>
+            </a:pPr>
+            <a:r>
+              <a:rPr lang="en-US" sz="3500" dirty="0"/>
+              <a:t>We initially developed the game and its features in Python, anticipating that we would use Flask for the front-end</a:t>
+            </a:r>
+          </a:p>
+          <a:p>
+            <a:pPr lvl="1" indent="-228600" algn="l">
+              <a:lnSpc>
+                <a:spcPct val="110000"/>
+              </a:lnSpc>
+              <a:spcBef>
+                <a:spcPts val="1000"/>
+              </a:spcBef>
+              <a:buFont typeface="Arial" panose="020B0604020202020204" pitchFamily="34" charset="0"/>
+              <a:buChar char="•"/>
+            </a:pPr>
+            <a:r>
+              <a:rPr lang="en-US" sz="3500" dirty="0"/>
+              <a:t>Upon reaching the JavaScript portion of the course, we determined that we could integrate HTML/CSS with JavaScript in a cleaner way</a:t>
+            </a:r>
+          </a:p>
+          <a:p>
+            <a:pPr lvl="1" indent="-228600" algn="l">
+              <a:lnSpc>
+                <a:spcPct val="110000"/>
+              </a:lnSpc>
+              <a:spcBef>
+                <a:spcPts val="1000"/>
+              </a:spcBef>
+              <a:buFont typeface="Arial" panose="020B0604020202020204" pitchFamily="34" charset="0"/>
+              <a:buChar char="•"/>
+            </a:pPr>
+            <a:r>
+              <a:rPr lang="en-US" sz="3500" dirty="0"/>
+              <a:t>Translating the existing Python code into JavaScript was time-consuming, and some features that were useful in Python but less so in JavaScript fell away</a:t>
+            </a:r>
+          </a:p>
+          <a:p>
+            <a:pPr indent="-228600">
+              <a:lnSpc>
+                <a:spcPct val="110000"/>
+              </a:lnSpc>
+              <a:buFont typeface="Arial" panose="020B0604020202020204" pitchFamily="34" charset="0"/>
+              <a:buChar char="•"/>
+            </a:pPr>
+            <a:r>
+              <a:rPr lang="en-US" sz="4800" dirty="0"/>
+              <a:t>Coordinating Efforts</a:t>
+            </a:r>
+          </a:p>
+          <a:p>
+            <a:pPr lvl="1" indent="-228600" algn="l">
+              <a:lnSpc>
+                <a:spcPct val="110000"/>
+              </a:lnSpc>
+              <a:buFont typeface="Arial" panose="020B0604020202020204" pitchFamily="34" charset="0"/>
+              <a:buChar char="•"/>
+            </a:pPr>
+            <a:r>
+              <a:rPr lang="en-US" sz="3500" dirty="0"/>
+              <a:t>Coordinating meetings across four different time zones was challenging and led the team to modify its Scrum approach to rely more on messaging in Discord to drive the project forward</a:t>
+            </a:r>
+          </a:p>
+          <a:p>
+            <a:pPr lvl="1" indent="-228600" algn="l">
+              <a:lnSpc>
+                <a:spcPct val="110000"/>
+              </a:lnSpc>
+              <a:buFont typeface="Arial" panose="020B0604020202020204" pitchFamily="34" charset="0"/>
+              <a:buChar char="•"/>
+            </a:pPr>
+            <a:r>
+              <a:rPr lang="en-US" sz="3500" dirty="0"/>
+              <a:t>Team members had different levels of comfort with various tools (HTML/CSS and Heroku in particular)</a:t>
+            </a:r>
+          </a:p>
+        </p:txBody>
+      </p:sp>
+    </p:spTree>
+    <p:extLst>
+      <p:ext uri="{BB962C8B-B14F-4D97-AF65-F5344CB8AC3E}">
+        <p14:creationId xmlns:p14="http://schemas.microsoft.com/office/powerpoint/2010/main" val="3726590022"/>
+      </p:ext>
+    </p:extLst>
+  </p:cSld>
+  <p:clrMapOvr>
+    <a:masterClrMapping/>
+  </p:clrMapOvr>
+</p:sld>
+</file>
+
+<file path=ppt/slides/slide18.xml><?xml version="1.0" encoding="utf-8"?>
+<p:sld xmlns:a="http://schemas.openxmlformats.org/drawingml/2006/main" xmlns:r="http://schemas.openxmlformats.org/officeDocument/2006/relationships" xmlns:p="http://schemas.openxmlformats.org/presentationml/2006/main">
+  <p:cSld>
+    <p:spTree>
+      <p:nvGrpSpPr>
+        <p:cNvPr id="1" name=""/>
+        <p:cNvGrpSpPr/>
+        <p:nvPr/>
+      </p:nvGrpSpPr>
+      <p:grpSpPr>
+        <a:xfrm>
+          <a:off x="0" y="0"/>
+          <a:ext cx="0" cy="0"/>
+          <a:chOff x="0" y="0"/>
+          <a:chExt cx="0" cy="0"/>
+        </a:xfrm>
+      </p:grpSpPr>
+      <p:sp>
+        <p:nvSpPr>
           <p:cNvPr id="4" name="Title 3">
             <a:extLst>
               <a:ext uri="{FF2B5EF4-FFF2-40B4-BE49-F238E27FC236}">
@@ -7334,7 +7521,7 @@
 </p:sld>
 </file>
 
-<file path=ppt/slides/slide18.xml><?xml version="1.0" encoding="utf-8"?>
+<file path=ppt/slides/slide19.xml><?xml version="1.0" encoding="utf-8"?>
 <p:sld xmlns:a="http://schemas.openxmlformats.org/drawingml/2006/main" xmlns:r="http://schemas.openxmlformats.org/officeDocument/2006/relationships" xmlns:p="http://schemas.openxmlformats.org/presentationml/2006/main">
   <p:cSld>
     <p:spTree>

</xml_diff>